<commit_message>
front page 정리, AA 배포 관련 함수 추가, Tooltip 추가, drawio sequence 작성 중
</commit_message>
<xml_diff>
--- a/ERC4337.pptx
+++ b/ERC4337.pptx
@@ -4477,6 +4477,36 @@
           </a:fontRef>
         </p:style>
       </p:cxnSp>
+      <p:pic>
+        <p:nvPicPr>
+          <p:cNvPr id="11" name="그림 10">
+            <a:extLst>
+              <a:ext uri="{FF2B5EF4-FFF2-40B4-BE49-F238E27FC236}">
+                <a16:creationId xmlns:a16="http://schemas.microsoft.com/office/drawing/2014/main" id="{067EBB86-1925-BD74-0864-8F0F1A644E21}"/>
+              </a:ext>
+            </a:extLst>
+          </p:cNvPr>
+          <p:cNvPicPr>
+            <a:picLocks noChangeAspect="1"/>
+          </p:cNvPicPr>
+          <p:nvPr/>
+        </p:nvPicPr>
+        <p:blipFill>
+          <a:blip r:embed="rId4"/>
+          <a:stretch>
+            <a:fillRect/>
+          </a:stretch>
+        </p:blipFill>
+        <p:spPr>
+          <a:xfrm>
+            <a:off x="8356963" y="2422776"/>
+            <a:ext cx="3667252" cy="2901048"/>
+          </a:xfrm>
+          <a:prstGeom prst="rect">
+            <a:avLst/>
+          </a:prstGeom>
+        </p:spPr>
+      </p:pic>
     </p:spTree>
     <p:extLst>
       <p:ext uri="{BB962C8B-B14F-4D97-AF65-F5344CB8AC3E}">
@@ -4757,7 +4787,7 @@
         <p:spPr>
           <a:xfrm>
             <a:off x="2005149" y="307696"/>
-            <a:ext cx="4433751" cy="369332"/>
+            <a:ext cx="4595948" cy="369332"/>
           </a:xfrm>
           <a:prstGeom prst="rect">
             <a:avLst/>
@@ -4820,7 +4850,7 @@
                   <a:schemeClr val="tx1"/>
                 </a:solidFill>
               </a:rPr>
-              <a:t>배제 </a:t>
+              <a:t>요소 배제 </a:t>
             </a:r>
             <a:r>
               <a:rPr lang="en-US" altLang="ko-KR" sz="1600" b="1" dirty="0">
@@ -6429,7 +6459,7 @@
         <p:spPr>
           <a:xfrm>
             <a:off x="0" y="946947"/>
-            <a:ext cx="8740362" cy="2031325"/>
+            <a:ext cx="8740362" cy="2308324"/>
           </a:xfrm>
           <a:prstGeom prst="rect">
             <a:avLst/>
@@ -6641,7 +6671,7 @@
               <a:rPr lang="af-ZA" altLang="ko-KR" dirty="0">
                 <a:hlinkClick r:id="rId5"/>
               </a:rPr>
-              <a:t>UX</a:t>
+              <a:t>Xangle - UX</a:t>
             </a:r>
             <a:r>
               <a:rPr lang="ko-KR" altLang="en-US" dirty="0">
@@ -6679,7 +6709,26 @@
               <a:rPr lang="af-ZA" altLang="ko-KR" dirty="0">
                 <a:hlinkClick r:id="rId7"/>
               </a:rPr>
-              <a:t>UserOp Explorer https://jiffyscan.xyz/</a:t>
+              <a:t>UserOp Explorer</a:t>
+            </a:r>
+            <a:r>
+              <a:rPr lang="af-ZA" altLang="ko-KR" dirty="0">
+                <a:hlinkClick r:id="rId7"/>
+              </a:rPr>
+              <a:t> - https://jiffyscan.xyz/</a:t>
+            </a:r>
+            <a:endParaRPr lang="af-ZA" altLang="ko-KR" dirty="0"/>
+          </a:p>
+          <a:p>
+            <a:pPr marL="342900" indent="-342900" fontAlgn="ctr">
+              <a:buFontTx/>
+              <a:buAutoNum type="arabicPeriod"/>
+            </a:pPr>
+            <a:r>
+              <a:rPr lang="af-ZA" altLang="ko-KR" dirty="0">
+                <a:hlinkClick r:id="rId8"/>
+              </a:rPr>
+              <a:t>Chainlink CCIP – pay in native</a:t>
             </a:r>
             <a:endParaRPr lang="af-ZA" altLang="ko-KR" dirty="0"/>
           </a:p>

</xml_diff>

<commit_message>
drawio ccip sequence 작성중, ppt 응용방안2(evm외 network bridge) 작성중
</commit_message>
<xml_diff>
--- a/ERC4337.pptx
+++ b/ERC4337.pptx
@@ -21,7 +21,8 @@
     <p:sldId id="274" r:id="rId15"/>
     <p:sldId id="275" r:id="rId16"/>
     <p:sldId id="276" r:id="rId17"/>
-    <p:sldId id="261" r:id="rId18"/>
+    <p:sldId id="277" r:id="rId18"/>
+    <p:sldId id="261" r:id="rId19"/>
   </p:sldIdLst>
   <p:sldSz cx="12192000" cy="6858000"/>
   <p:notesSz cx="6858000" cy="9144000"/>
@@ -275,7 +276,7 @@
           <a:p>
             <a:fld id="{A08D1B0F-02AC-4195-A768-B4986CE95E63}" type="datetimeFigureOut">
               <a:rPr lang="ko-KR" altLang="en-US" smtClean="0"/>
-              <a:t>2024-02-28</a:t>
+              <a:t>2024-03-04</a:t>
             </a:fld>
             <a:endParaRPr lang="ko-KR" altLang="en-US"/>
           </a:p>
@@ -473,7 +474,7 @@
           <a:p>
             <a:fld id="{A08D1B0F-02AC-4195-A768-B4986CE95E63}" type="datetimeFigureOut">
               <a:rPr lang="ko-KR" altLang="en-US" smtClean="0"/>
-              <a:t>2024-02-28</a:t>
+              <a:t>2024-03-04</a:t>
             </a:fld>
             <a:endParaRPr lang="ko-KR" altLang="en-US"/>
           </a:p>
@@ -681,7 +682,7 @@
           <a:p>
             <a:fld id="{A08D1B0F-02AC-4195-A768-B4986CE95E63}" type="datetimeFigureOut">
               <a:rPr lang="ko-KR" altLang="en-US" smtClean="0"/>
-              <a:t>2024-02-28</a:t>
+              <a:t>2024-03-04</a:t>
             </a:fld>
             <a:endParaRPr lang="ko-KR" altLang="en-US"/>
           </a:p>
@@ -879,7 +880,7 @@
           <a:p>
             <a:fld id="{A08D1B0F-02AC-4195-A768-B4986CE95E63}" type="datetimeFigureOut">
               <a:rPr lang="ko-KR" altLang="en-US" smtClean="0"/>
-              <a:t>2024-02-28</a:t>
+              <a:t>2024-03-04</a:t>
             </a:fld>
             <a:endParaRPr lang="ko-KR" altLang="en-US"/>
           </a:p>
@@ -1154,7 +1155,7 @@
           <a:p>
             <a:fld id="{A08D1B0F-02AC-4195-A768-B4986CE95E63}" type="datetimeFigureOut">
               <a:rPr lang="ko-KR" altLang="en-US" smtClean="0"/>
-              <a:t>2024-02-28</a:t>
+              <a:t>2024-03-04</a:t>
             </a:fld>
             <a:endParaRPr lang="ko-KR" altLang="en-US"/>
           </a:p>
@@ -1419,7 +1420,7 @@
           <a:p>
             <a:fld id="{A08D1B0F-02AC-4195-A768-B4986CE95E63}" type="datetimeFigureOut">
               <a:rPr lang="ko-KR" altLang="en-US" smtClean="0"/>
-              <a:t>2024-02-28</a:t>
+              <a:t>2024-03-04</a:t>
             </a:fld>
             <a:endParaRPr lang="ko-KR" altLang="en-US"/>
           </a:p>
@@ -1831,7 +1832,7 @@
           <a:p>
             <a:fld id="{A08D1B0F-02AC-4195-A768-B4986CE95E63}" type="datetimeFigureOut">
               <a:rPr lang="ko-KR" altLang="en-US" smtClean="0"/>
-              <a:t>2024-02-28</a:t>
+              <a:t>2024-03-04</a:t>
             </a:fld>
             <a:endParaRPr lang="ko-KR" altLang="en-US"/>
           </a:p>
@@ -1972,7 +1973,7 @@
           <a:p>
             <a:fld id="{A08D1B0F-02AC-4195-A768-B4986CE95E63}" type="datetimeFigureOut">
               <a:rPr lang="ko-KR" altLang="en-US" smtClean="0"/>
-              <a:t>2024-02-28</a:t>
+              <a:t>2024-03-04</a:t>
             </a:fld>
             <a:endParaRPr lang="ko-KR" altLang="en-US"/>
           </a:p>
@@ -2085,7 +2086,7 @@
           <a:p>
             <a:fld id="{A08D1B0F-02AC-4195-A768-B4986CE95E63}" type="datetimeFigureOut">
               <a:rPr lang="ko-KR" altLang="en-US" smtClean="0"/>
-              <a:t>2024-02-28</a:t>
+              <a:t>2024-03-04</a:t>
             </a:fld>
             <a:endParaRPr lang="ko-KR" altLang="en-US"/>
           </a:p>
@@ -2396,7 +2397,7 @@
           <a:p>
             <a:fld id="{A08D1B0F-02AC-4195-A768-B4986CE95E63}" type="datetimeFigureOut">
               <a:rPr lang="ko-KR" altLang="en-US" smtClean="0"/>
-              <a:t>2024-02-28</a:t>
+              <a:t>2024-03-04</a:t>
             </a:fld>
             <a:endParaRPr lang="ko-KR" altLang="en-US"/>
           </a:p>
@@ -2684,7 +2685,7 @@
           <a:p>
             <a:fld id="{A08D1B0F-02AC-4195-A768-B4986CE95E63}" type="datetimeFigureOut">
               <a:rPr lang="ko-KR" altLang="en-US" smtClean="0"/>
-              <a:t>2024-02-28</a:t>
+              <a:t>2024-03-04</a:t>
             </a:fld>
             <a:endParaRPr lang="ko-KR" altLang="en-US"/>
           </a:p>
@@ -2925,7 +2926,7 @@
           <a:p>
             <a:fld id="{A08D1B0F-02AC-4195-A768-B4986CE95E63}" type="datetimeFigureOut">
               <a:rPr lang="ko-KR" altLang="en-US" smtClean="0"/>
-              <a:t>2024-02-28</a:t>
+              <a:t>2024-03-04</a:t>
             </a:fld>
             <a:endParaRPr lang="ko-KR" altLang="en-US"/>
           </a:p>
@@ -5712,7 +5713,7 @@
         <p:spPr>
           <a:xfrm>
             <a:off x="425147" y="1041439"/>
-            <a:ext cx="9420528" cy="3477875"/>
+            <a:ext cx="9420528" cy="3724096"/>
           </a:xfrm>
           <a:prstGeom prst="rect">
             <a:avLst/>
@@ -5961,6 +5962,19 @@
               <a:t>이 필요함</a:t>
             </a:r>
             <a:endParaRPr lang="en-US" altLang="ko-KR" sz="1600" dirty="0"/>
+          </a:p>
+          <a:p>
+            <a:r>
+              <a:rPr lang="en-US" altLang="ko-KR" sz="1600" dirty="0"/>
+              <a:t>- Alchemy Log, </a:t>
+            </a:r>
+            <a:r>
+              <a:rPr lang="af-ZA" altLang="ko-KR" sz="1600" dirty="0">
+                <a:hlinkClick r:id="rId2"/>
+              </a:rPr>
+              <a:t>https://jiffyscan.xyz/</a:t>
+            </a:r>
+            <a:endParaRPr lang="af-ZA" altLang="ko-KR" sz="1600" dirty="0"/>
           </a:p>
         </p:txBody>
       </p:sp>
@@ -6036,7 +6050,16 @@
                 </a:solidFill>
                 <a:latin typeface="system-ui"/>
               </a:rPr>
-              <a:t>응용방안 제안</a:t>
+              <a:t>응용방안 제안 </a:t>
+            </a:r>
+            <a:r>
+              <a:rPr lang="en-US" altLang="ko-KR" sz="2800" dirty="0">
+                <a:solidFill>
+                  <a:srgbClr val="212529"/>
+                </a:solidFill>
+                <a:latin typeface="system-ui"/>
+              </a:rPr>
+              <a:t>1</a:t>
             </a:r>
             <a:endParaRPr lang="en-US" altLang="ko-KR" sz="2800" b="0" i="0" dirty="0">
               <a:solidFill>
@@ -6102,7 +6125,7 @@
                   <a:schemeClr val="tx1"/>
                 </a:solidFill>
               </a:rPr>
-              <a:t>CCIP – </a:t>
+              <a:t>CCIP fee </a:t>
             </a:r>
             <a:r>
               <a:rPr lang="ko-KR" altLang="en-US" sz="1600" b="1" dirty="0">
@@ -6292,7 +6315,16 @@
                 </a:solidFill>
                 <a:latin typeface="system-ui"/>
               </a:rPr>
-              <a:t>응용방안 제안</a:t>
+              <a:t>응용방안 제안 </a:t>
+            </a:r>
+            <a:r>
+              <a:rPr lang="en-US" altLang="ko-KR" sz="2800" dirty="0">
+                <a:solidFill>
+                  <a:srgbClr val="212529"/>
+                </a:solidFill>
+                <a:latin typeface="system-ui"/>
+              </a:rPr>
+              <a:t>1</a:t>
             </a:r>
             <a:endParaRPr lang="en-US" altLang="ko-KR" sz="2800" b="0" i="0" dirty="0">
               <a:solidFill>
@@ -6304,12 +6336,42 @@
           </a:p>
         </p:txBody>
       </p:sp>
-      <p:sp>
-        <p:nvSpPr>
-          <p:cNvPr id="41" name="직사각형 40">
-            <a:extLst>
-              <a:ext uri="{FF2B5EF4-FFF2-40B4-BE49-F238E27FC236}">
-                <a16:creationId xmlns:a16="http://schemas.microsoft.com/office/drawing/2014/main" id="{C04E6A43-561F-769E-1B34-66726134F8E4}"/>
+      <p:pic>
+        <p:nvPicPr>
+          <p:cNvPr id="11" name="그림 10">
+            <a:extLst>
+              <a:ext uri="{FF2B5EF4-FFF2-40B4-BE49-F238E27FC236}">
+                <a16:creationId xmlns:a16="http://schemas.microsoft.com/office/drawing/2014/main" id="{0FDFFC17-425A-43B6-03C7-2E6FE1512EC4}"/>
+              </a:ext>
+            </a:extLst>
+          </p:cNvPr>
+          <p:cNvPicPr>
+            <a:picLocks noChangeAspect="1"/>
+          </p:cNvPicPr>
+          <p:nvPr/>
+        </p:nvPicPr>
+        <p:blipFill>
+          <a:blip r:embed="rId2"/>
+          <a:stretch>
+            <a:fillRect/>
+          </a:stretch>
+        </p:blipFill>
+        <p:spPr>
+          <a:xfrm>
+            <a:off x="75360" y="1018838"/>
+            <a:ext cx="12041280" cy="4820323"/>
+          </a:xfrm>
+          <a:prstGeom prst="rect">
+            <a:avLst/>
+          </a:prstGeom>
+        </p:spPr>
+      </p:pic>
+      <p:sp>
+        <p:nvSpPr>
+          <p:cNvPr id="7" name="직사각형 6">
+            <a:extLst>
+              <a:ext uri="{FF2B5EF4-FFF2-40B4-BE49-F238E27FC236}">
+                <a16:creationId xmlns:a16="http://schemas.microsoft.com/office/drawing/2014/main" id="{EA4C0793-6B86-7204-34A0-E719760420C5}"/>
               </a:ext>
             </a:extLst>
           </p:cNvPr>
@@ -6318,7 +6380,7 @@
         </p:nvSpPr>
         <p:spPr>
           <a:xfrm>
-            <a:off x="3276601" y="307696"/>
+            <a:off x="3328851" y="307696"/>
             <a:ext cx="3775165" cy="369332"/>
           </a:xfrm>
           <a:prstGeom prst="rect">
@@ -6358,7 +6420,7 @@
                   <a:schemeClr val="tx1"/>
                 </a:solidFill>
               </a:rPr>
-              <a:t>CCIP – </a:t>
+              <a:t>CCIP fee </a:t>
             </a:r>
             <a:r>
               <a:rPr lang="ko-KR" altLang="en-US" sz="1600" b="1" dirty="0">
@@ -6384,36 +6446,6 @@
           </a:p>
         </p:txBody>
       </p:sp>
-      <p:pic>
-        <p:nvPicPr>
-          <p:cNvPr id="11" name="그림 10">
-            <a:extLst>
-              <a:ext uri="{FF2B5EF4-FFF2-40B4-BE49-F238E27FC236}">
-                <a16:creationId xmlns:a16="http://schemas.microsoft.com/office/drawing/2014/main" id="{0FDFFC17-425A-43B6-03C7-2E6FE1512EC4}"/>
-              </a:ext>
-            </a:extLst>
-          </p:cNvPr>
-          <p:cNvPicPr>
-            <a:picLocks noChangeAspect="1"/>
-          </p:cNvPicPr>
-          <p:nvPr/>
-        </p:nvPicPr>
-        <p:blipFill>
-          <a:blip r:embed="rId2"/>
-          <a:stretch>
-            <a:fillRect/>
-          </a:stretch>
-        </p:blipFill>
-        <p:spPr>
-          <a:xfrm>
-            <a:off x="75360" y="1018838"/>
-            <a:ext cx="12041280" cy="4820323"/>
-          </a:xfrm>
-          <a:prstGeom prst="rect">
-            <a:avLst/>
-          </a:prstGeom>
-        </p:spPr>
-      </p:pic>
     </p:spTree>
     <p:extLst>
       <p:ext uri="{BB962C8B-B14F-4D97-AF65-F5344CB8AC3E}">
@@ -6432,6 +6464,179 @@
   <p:cSld>
     <p:spTree>
       <p:nvGrpSpPr>
+        <p:cNvPr id="1" name="">
+          <a:extLst>
+            <a:ext uri="{FF2B5EF4-FFF2-40B4-BE49-F238E27FC236}">
+              <a16:creationId xmlns:a16="http://schemas.microsoft.com/office/drawing/2014/main" id="{0FB2F73D-BBAB-4EA7-8394-D401E8313AF0}"/>
+            </a:ext>
+          </a:extLst>
+        </p:cNvPr>
+        <p:cNvGrpSpPr/>
+        <p:nvPr/>
+      </p:nvGrpSpPr>
+      <p:grpSpPr>
+        <a:xfrm>
+          <a:off x="0" y="0"/>
+          <a:ext cx="0" cy="0"/>
+          <a:chOff x="0" y="0"/>
+          <a:chExt cx="0" cy="0"/>
+        </a:xfrm>
+      </p:grpSpPr>
+      <p:sp>
+        <p:nvSpPr>
+          <p:cNvPr id="6" name="TextBox 5">
+            <a:extLst>
+              <a:ext uri="{FF2B5EF4-FFF2-40B4-BE49-F238E27FC236}">
+                <a16:creationId xmlns:a16="http://schemas.microsoft.com/office/drawing/2014/main" id="{B01BC301-8353-EBFF-E88D-BF50690324C5}"/>
+              </a:ext>
+            </a:extLst>
+          </p:cNvPr>
+          <p:cNvSpPr txBox="1"/>
+          <p:nvPr/>
+        </p:nvSpPr>
+        <p:spPr>
+          <a:xfrm>
+            <a:off x="185923" y="200373"/>
+            <a:ext cx="7590831" cy="523220"/>
+          </a:xfrm>
+          <a:prstGeom prst="rect">
+            <a:avLst/>
+          </a:prstGeom>
+          <a:noFill/>
+        </p:spPr>
+        <p:txBody>
+          <a:bodyPr wrap="square" rtlCol="0">
+            <a:spAutoFit/>
+          </a:bodyPr>
+          <a:lstStyle/>
+          <a:p>
+            <a:pPr algn="l" fontAlgn="ctr"/>
+            <a:r>
+              <a:rPr lang="ko-KR" altLang="en-US" sz="2800" dirty="0">
+                <a:solidFill>
+                  <a:srgbClr val="212529"/>
+                </a:solidFill>
+                <a:latin typeface="system-ui"/>
+              </a:rPr>
+              <a:t>응용방안 제안 </a:t>
+            </a:r>
+            <a:r>
+              <a:rPr lang="en-US" altLang="ko-KR" sz="2800" dirty="0">
+                <a:solidFill>
+                  <a:srgbClr val="212529"/>
+                </a:solidFill>
+                <a:latin typeface="system-ui"/>
+              </a:rPr>
+              <a:t>2</a:t>
+            </a:r>
+            <a:endParaRPr lang="en-US" altLang="ko-KR" sz="2800" b="0" i="0" dirty="0">
+              <a:solidFill>
+                <a:srgbClr val="212529"/>
+              </a:solidFill>
+              <a:effectLst/>
+              <a:latin typeface="system-ui"/>
+            </a:endParaRPr>
+          </a:p>
+        </p:txBody>
+      </p:sp>
+      <p:sp>
+        <p:nvSpPr>
+          <p:cNvPr id="7" name="직사각형 6">
+            <a:extLst>
+              <a:ext uri="{FF2B5EF4-FFF2-40B4-BE49-F238E27FC236}">
+                <a16:creationId xmlns:a16="http://schemas.microsoft.com/office/drawing/2014/main" id="{C30B4A8C-4810-CC99-3F8C-A63FBAEEE0CD}"/>
+              </a:ext>
+            </a:extLst>
+          </p:cNvPr>
+          <p:cNvSpPr/>
+          <p:nvPr/>
+        </p:nvSpPr>
+        <p:spPr>
+          <a:xfrm>
+            <a:off x="3328851" y="307696"/>
+            <a:ext cx="3775165" cy="369332"/>
+          </a:xfrm>
+          <a:prstGeom prst="rect">
+            <a:avLst/>
+          </a:prstGeom>
+          <a:noFill/>
+          <a:ln w="57150">
+            <a:solidFill>
+              <a:srgbClr val="0B76A0"/>
+            </a:solidFill>
+          </a:ln>
+        </p:spPr>
+        <p:style>
+          <a:lnRef idx="2">
+            <a:schemeClr val="accent1">
+              <a:shade val="15000"/>
+            </a:schemeClr>
+          </a:lnRef>
+          <a:fillRef idx="1">
+            <a:schemeClr val="accent1"/>
+          </a:fillRef>
+          <a:effectRef idx="0">
+            <a:schemeClr val="accent1"/>
+          </a:effectRef>
+          <a:fontRef idx="minor">
+            <a:schemeClr val="lt1"/>
+          </a:fontRef>
+        </p:style>
+        <p:txBody>
+          <a:bodyPr rtlCol="0" anchor="ctr"/>
+          <a:lstStyle/>
+          <a:p>
+            <a:pPr algn="ctr"/>
+            <a:r>
+              <a:rPr lang="en-US" altLang="ko-KR" sz="1600" b="1" dirty="0">
+                <a:solidFill>
+                  <a:schemeClr val="tx1"/>
+                </a:solidFill>
+              </a:rPr>
+              <a:t>Non EVM Network</a:t>
+            </a:r>
+            <a:r>
+              <a:rPr lang="ko-KR" altLang="en-US" sz="1600" b="1" dirty="0">
+                <a:solidFill>
+                  <a:schemeClr val="tx1"/>
+                </a:solidFill>
+              </a:rPr>
+              <a:t> </a:t>
+            </a:r>
+            <a:r>
+              <a:rPr lang="en-US" altLang="ko-KR" sz="1600" b="1" dirty="0">
+                <a:solidFill>
+                  <a:schemeClr val="tx1"/>
+                </a:solidFill>
+              </a:rPr>
+              <a:t>Bridge</a:t>
+            </a:r>
+            <a:endParaRPr lang="ko-KR" altLang="en-US" sz="1600" b="1" dirty="0">
+              <a:solidFill>
+                <a:schemeClr val="tx1"/>
+              </a:solidFill>
+            </a:endParaRPr>
+          </a:p>
+        </p:txBody>
+      </p:sp>
+    </p:spTree>
+    <p:extLst>
+      <p:ext uri="{BB962C8B-B14F-4D97-AF65-F5344CB8AC3E}">
+        <p14:creationId xmlns:p14="http://schemas.microsoft.com/office/powerpoint/2010/main" val="3781674704"/>
+      </p:ext>
+    </p:extLst>
+  </p:cSld>
+  <p:clrMapOvr>
+    <a:masterClrMapping/>
+  </p:clrMapOvr>
+</p:sld>
+</file>
+
+<file path=ppt/slides/slide18.xml><?xml version="1.0" encoding="utf-8"?>
+<p:sld xmlns:a="http://schemas.openxmlformats.org/drawingml/2006/main" xmlns:r="http://schemas.openxmlformats.org/officeDocument/2006/relationships" xmlns:p="http://schemas.openxmlformats.org/presentationml/2006/main">
+  <p:cSld>
+    <p:spTree>
+      <p:nvGrpSpPr>
         <p:cNvPr id="1" name=""/>
         <p:cNvGrpSpPr/>
         <p:nvPr/>
@@ -6709,13 +6914,7 @@
               <a:rPr lang="af-ZA" altLang="ko-KR" dirty="0">
                 <a:hlinkClick r:id="rId7"/>
               </a:rPr>
-              <a:t>UserOp Explorer</a:t>
-            </a:r>
-            <a:r>
-              <a:rPr lang="af-ZA" altLang="ko-KR" dirty="0">
-                <a:hlinkClick r:id="rId7"/>
-              </a:rPr>
-              <a:t> - https://jiffyscan.xyz/</a:t>
+              <a:t>UserOp Explorer - https://jiffyscan.xyz/</a:t>
             </a:r>
             <a:endParaRPr lang="af-ZA" altLang="ko-KR" dirty="0"/>
           </a:p>
@@ -8735,6 +8934,75 @@
                 <a:schemeClr val="tx1"/>
               </a:solidFill>
             </a:endParaRPr>
+          </a:p>
+        </p:txBody>
+      </p:sp>
+      <p:sp>
+        <p:nvSpPr>
+          <p:cNvPr id="3" name="TextBox 2">
+            <a:extLst>
+              <a:ext uri="{FF2B5EF4-FFF2-40B4-BE49-F238E27FC236}">
+                <a16:creationId xmlns:a16="http://schemas.microsoft.com/office/drawing/2014/main" id="{36D03FBD-3EED-FCAC-0E82-E8338D816B59}"/>
+              </a:ext>
+            </a:extLst>
+          </p:cNvPr>
+          <p:cNvSpPr txBox="1"/>
+          <p:nvPr/>
+        </p:nvSpPr>
+        <p:spPr>
+          <a:xfrm>
+            <a:off x="9721844" y="930581"/>
+            <a:ext cx="1604927" cy="369332"/>
+          </a:xfrm>
+          <a:prstGeom prst="rect">
+            <a:avLst/>
+          </a:prstGeom>
+          <a:noFill/>
+        </p:spPr>
+        <p:txBody>
+          <a:bodyPr wrap="none" rtlCol="0">
+            <a:spAutoFit/>
+          </a:bodyPr>
+          <a:lstStyle/>
+          <a:p>
+            <a:r>
+              <a:rPr lang="ko-KR" altLang="en-US" sz="1400" b="1" dirty="0">
+                <a:solidFill>
+                  <a:schemeClr val="accent4">
+                    <a:lumMod val="75000"/>
+                  </a:schemeClr>
+                </a:solidFill>
+              </a:rPr>
+              <a:t>커스텀</a:t>
+            </a:r>
+            <a:r>
+              <a:rPr lang="ko-KR" altLang="en-US" dirty="0"/>
+              <a:t> </a:t>
+            </a:r>
+            <a:r>
+              <a:rPr lang="ko-KR" altLang="en-US" sz="1400" b="1" dirty="0">
+                <a:solidFill>
+                  <a:schemeClr val="accent4">
+                    <a:lumMod val="75000"/>
+                  </a:schemeClr>
+                </a:solidFill>
+              </a:rPr>
+              <a:t>가능</a:t>
+            </a:r>
+            <a:r>
+              <a:rPr lang="ko-KR" altLang="en-US" dirty="0"/>
+              <a:t> </a:t>
+            </a:r>
+            <a:r>
+              <a:rPr lang="ko-KR" altLang="en-US" sz="1400" b="1" dirty="0">
+                <a:solidFill>
+                  <a:schemeClr val="accent4">
+                    <a:lumMod val="75000"/>
+                  </a:schemeClr>
+                </a:solidFill>
+              </a:rPr>
+              <a:t>영역</a:t>
+            </a:r>
           </a:p>
         </p:txBody>
       </p:sp>

</xml_diff>